<commit_message>
neocrawler as a common crawler separated from instance
</commit_message>
<xml_diff>
--- a/doc/uxcrawler-architecture.pptx
+++ b/doc/uxcrawler-architecture.pptx
@@ -293,7 +293,7 @@
           <a:p>
             <a:fld id="{530820CF-B880-4189-942D-D702A7CBA730}" type="datetimeFigureOut">
               <a:rPr lang="zh-CN" altLang="en-US" smtClean="0"/>
-              <a:t>2013/11/18</a:t>
+              <a:t>2014/3/4</a:t>
             </a:fld>
             <a:endParaRPr lang="zh-CN" altLang="en-US"/>
           </a:p>
@@ -458,7 +458,7 @@
           <a:p>
             <a:fld id="{530820CF-B880-4189-942D-D702A7CBA730}" type="datetimeFigureOut">
               <a:rPr lang="zh-CN" altLang="en-US" smtClean="0"/>
-              <a:t>2013/11/18</a:t>
+              <a:t>2014/3/4</a:t>
             </a:fld>
             <a:endParaRPr lang="zh-CN" altLang="en-US"/>
           </a:p>
@@ -633,7 +633,7 @@
           <a:p>
             <a:fld id="{530820CF-B880-4189-942D-D702A7CBA730}" type="datetimeFigureOut">
               <a:rPr lang="zh-CN" altLang="en-US" smtClean="0"/>
-              <a:t>2013/11/18</a:t>
+              <a:t>2014/3/4</a:t>
             </a:fld>
             <a:endParaRPr lang="zh-CN" altLang="en-US"/>
           </a:p>
@@ -798,7 +798,7 @@
           <a:p>
             <a:fld id="{530820CF-B880-4189-942D-D702A7CBA730}" type="datetimeFigureOut">
               <a:rPr lang="zh-CN" altLang="en-US" smtClean="0"/>
-              <a:t>2013/11/18</a:t>
+              <a:t>2014/3/4</a:t>
             </a:fld>
             <a:endParaRPr lang="zh-CN" altLang="en-US"/>
           </a:p>
@@ -1039,7 +1039,7 @@
           <a:p>
             <a:fld id="{530820CF-B880-4189-942D-D702A7CBA730}" type="datetimeFigureOut">
               <a:rPr lang="zh-CN" altLang="en-US" smtClean="0"/>
-              <a:t>2013/11/18</a:t>
+              <a:t>2014/3/4</a:t>
             </a:fld>
             <a:endParaRPr lang="zh-CN" altLang="en-US"/>
           </a:p>
@@ -1322,7 +1322,7 @@
           <a:p>
             <a:fld id="{530820CF-B880-4189-942D-D702A7CBA730}" type="datetimeFigureOut">
               <a:rPr lang="zh-CN" altLang="en-US" smtClean="0"/>
-              <a:t>2013/11/18</a:t>
+              <a:t>2014/3/4</a:t>
             </a:fld>
             <a:endParaRPr lang="zh-CN" altLang="en-US"/>
           </a:p>
@@ -1739,7 +1739,7 @@
           <a:p>
             <a:fld id="{530820CF-B880-4189-942D-D702A7CBA730}" type="datetimeFigureOut">
               <a:rPr lang="zh-CN" altLang="en-US" smtClean="0"/>
-              <a:t>2013/11/18</a:t>
+              <a:t>2014/3/4</a:t>
             </a:fld>
             <a:endParaRPr lang="zh-CN" altLang="en-US"/>
           </a:p>
@@ -1852,7 +1852,7 @@
           <a:p>
             <a:fld id="{530820CF-B880-4189-942D-D702A7CBA730}" type="datetimeFigureOut">
               <a:rPr lang="zh-CN" altLang="en-US" smtClean="0"/>
-              <a:t>2013/11/18</a:t>
+              <a:t>2014/3/4</a:t>
             </a:fld>
             <a:endParaRPr lang="zh-CN" altLang="en-US"/>
           </a:p>
@@ -1942,7 +1942,7 @@
           <a:p>
             <a:fld id="{530820CF-B880-4189-942D-D702A7CBA730}" type="datetimeFigureOut">
               <a:rPr lang="zh-CN" altLang="en-US" smtClean="0"/>
-              <a:t>2013/11/18</a:t>
+              <a:t>2014/3/4</a:t>
             </a:fld>
             <a:endParaRPr lang="zh-CN" altLang="en-US"/>
           </a:p>
@@ -2214,7 +2214,7 @@
           <a:p>
             <a:fld id="{530820CF-B880-4189-942D-D702A7CBA730}" type="datetimeFigureOut">
               <a:rPr lang="zh-CN" altLang="en-US" smtClean="0"/>
-              <a:t>2013/11/18</a:t>
+              <a:t>2014/3/4</a:t>
             </a:fld>
             <a:endParaRPr lang="zh-CN" altLang="en-US"/>
           </a:p>
@@ -2462,7 +2462,7 @@
           <a:p>
             <a:fld id="{530820CF-B880-4189-942D-D702A7CBA730}" type="datetimeFigureOut">
               <a:rPr lang="zh-CN" altLang="en-US" smtClean="0"/>
-              <a:t>2013/11/18</a:t>
+              <a:t>2014/3/4</a:t>
             </a:fld>
             <a:endParaRPr lang="zh-CN" altLang="en-US"/>
           </a:p>
@@ -2670,7 +2670,7 @@
           <a:p>
             <a:fld id="{530820CF-B880-4189-942D-D702A7CBA730}" type="datetimeFigureOut">
               <a:rPr lang="zh-CN" altLang="en-US" smtClean="0"/>
-              <a:t>2013/11/18</a:t>
+              <a:t>2014/3/4</a:t>
             </a:fld>
             <a:endParaRPr lang="zh-CN" altLang="en-US"/>
           </a:p>
@@ -3064,11 +3064,15 @@
           <a:p>
             <a:r>
               <a:rPr lang="en-US" altLang="zh-CN" dirty="0" err="1" smtClean="0"/>
-              <a:t>UXCrawler</a:t>
+              <a:t>NEOCrawler</a:t>
             </a:r>
             <a:r>
               <a:rPr lang="en-US" altLang="zh-CN" dirty="0" smtClean="0"/>
-              <a:t> Architecture </a:t>
+              <a:t> </a:t>
+            </a:r>
+            <a:r>
+              <a:rPr lang="en-US" altLang="zh-CN" dirty="0" smtClean="0"/>
+              <a:t>Architecture </a:t>
             </a:r>
             <a:endParaRPr lang="zh-CN" altLang="en-US" dirty="0"/>
           </a:p>

</xml_diff>